<commit_message>
replacing diagram in presentation with the right one.
</commit_message>
<xml_diff>
--- a/presentation.pptx
+++ b/presentation.pptx
@@ -33238,36 +33238,6 @@
           </a:p>
         </p:txBody>
       </p:sp>
-      <p:pic>
-        <p:nvPicPr>
-          <p:cNvPr id="5" name="Picture 4" descr="Diagram&#10;&#10;Description automatically generated">
-            <a:extLst>
-              <a:ext uri="{FF2B5EF4-FFF2-40B4-BE49-F238E27FC236}">
-                <a16:creationId xmlns:a16="http://schemas.microsoft.com/office/drawing/2014/main" id="{633A8480-DBC9-4BED-BF57-6A9230637DC1}"/>
-              </a:ext>
-            </a:extLst>
-          </p:cNvPr>
-          <p:cNvPicPr>
-            <a:picLocks noChangeAspect="1"/>
-          </p:cNvPicPr>
-          <p:nvPr/>
-        </p:nvPicPr>
-        <p:blipFill>
-          <a:blip r:embed="rId2"/>
-          <a:stretch>
-            <a:fillRect/>
-          </a:stretch>
-        </p:blipFill>
-        <p:spPr>
-          <a:xfrm>
-            <a:off x="314294" y="1002090"/>
-            <a:ext cx="6032524" cy="4712910"/>
-          </a:xfrm>
-          <a:prstGeom prst="rect">
-            <a:avLst/>
-          </a:prstGeom>
-        </p:spPr>
-      </p:pic>
       <p:sp>
         <p:nvSpPr>
           <p:cNvPr id="7" name="TextBox 6">
@@ -33354,6 +33324,36 @@
           </a:p>
         </p:txBody>
       </p:sp>
+      <p:pic>
+        <p:nvPicPr>
+          <p:cNvPr id="3" name="Picture 2" descr="Diagram&#10;&#10;Description automatically generated">
+            <a:extLst>
+              <a:ext uri="{FF2B5EF4-FFF2-40B4-BE49-F238E27FC236}">
+                <a16:creationId xmlns:a16="http://schemas.microsoft.com/office/drawing/2014/main" id="{BD00D347-CC69-4BAF-BA11-F40C1CCC3A87}"/>
+              </a:ext>
+            </a:extLst>
+          </p:cNvPr>
+          <p:cNvPicPr>
+            <a:picLocks noChangeAspect="1"/>
+          </p:cNvPicPr>
+          <p:nvPr/>
+        </p:nvPicPr>
+        <p:blipFill>
+          <a:blip r:embed="rId2"/>
+          <a:stretch>
+            <a:fillRect/>
+          </a:stretch>
+        </p:blipFill>
+        <p:spPr>
+          <a:xfrm>
+            <a:off x="160982" y="916866"/>
+            <a:ext cx="6185836" cy="4832684"/>
+          </a:xfrm>
+          <a:prstGeom prst="rect">
+            <a:avLst/>
+          </a:prstGeom>
+        </p:spPr>
+      </p:pic>
     </p:spTree>
     <p:extLst>
       <p:ext uri="{BB962C8B-B14F-4D97-AF65-F5344CB8AC3E}">
@@ -35173,21 +35173,6 @@
 </file>
 
 <file path=customXml/item1.xml><?xml version="1.0" encoding="utf-8"?>
-<p:properties xmlns:p="http://schemas.microsoft.com/office/2006/metadata/properties" xmlns:xsi="http://www.w3.org/2001/XMLSchema-instance" xmlns:pc="http://schemas.microsoft.com/office/infopath/2007/PartnerControls">
-  <documentManagement/>
-</p:properties>
-</file>
-
-<file path=customXml/item2.xml><?xml version="1.0" encoding="utf-8"?>
-<?mso-contentType ?>
-<FormTemplates xmlns="http://schemas.microsoft.com/sharepoint/v3/contenttype/forms">
-  <Display>DocumentLibraryForm</Display>
-  <Edit>DocumentLibraryForm</Edit>
-  <New>DocumentLibraryForm</New>
-</FormTemplates>
-</file>
-
-<file path=customXml/item3.xml><?xml version="1.0" encoding="utf-8"?>
 <ct:contentTypeSchema xmlns:ct="http://schemas.microsoft.com/office/2006/metadata/contentType" xmlns:ma="http://schemas.microsoft.com/office/2006/metadata/properties/metaAttributes" ct:_="" ma:_="" ma:contentTypeName="Document" ma:contentTypeID="0x01010025E19AE8BB01E547B9C94554E9602BAB" ma:contentTypeVersion="2" ma:contentTypeDescription="Create a new document." ma:contentTypeScope="" ma:versionID="81eb4f3333a95e1d0157c3fcf5afc7e3">
   <xsd:schema xmlns:xsd="http://www.w3.org/2001/XMLSchema" xmlns:xs="http://www.w3.org/2001/XMLSchema" xmlns:p="http://schemas.microsoft.com/office/2006/metadata/properties" xmlns:ns2="e794b067-c88c-4f69-971d-4e5f07b2fc26" targetNamespace="http://schemas.microsoft.com/office/2006/metadata/properties" ma:root="true" ma:fieldsID="d5a45a0f398227f31e7c66f9880980ab" ns2:_="">
     <xsd:import namespace="e794b067-c88c-4f69-971d-4e5f07b2fc26"/>
@@ -35319,31 +35304,22 @@
 </ct:contentTypeSchema>
 </file>
 
-<file path=customXml/itemProps1.xml><?xml version="1.0" encoding="utf-8"?>
-<ds:datastoreItem xmlns:ds="http://schemas.openxmlformats.org/officeDocument/2006/customXml" ds:itemID="{CAD84B9C-021F-40DE-807A-2D71E80356EE}">
-  <ds:schemaRefs>
-    <ds:schemaRef ds:uri="e794b067-c88c-4f69-971d-4e5f07b2fc26"/>
-    <ds:schemaRef ds:uri="http://schemas.microsoft.com/office/2006/metadata/properties"/>
-    <ds:schemaRef ds:uri="http://purl.org/dc/elements/1.1/"/>
-    <ds:schemaRef ds:uri="http://schemas.openxmlformats.org/package/2006/metadata/core-properties"/>
-    <ds:schemaRef ds:uri="http://purl.org/dc/terms/"/>
-    <ds:schemaRef ds:uri="http://www.w3.org/XML/1998/namespace"/>
-    <ds:schemaRef ds:uri="http://schemas.microsoft.com/office/2006/documentManagement/types"/>
-    <ds:schemaRef ds:uri="http://schemas.microsoft.com/office/infopath/2007/PartnerControls"/>
-    <ds:schemaRef ds:uri="http://purl.org/dc/dcmitype/"/>
-  </ds:schemaRefs>
-</ds:datastoreItem>
+<file path=customXml/item2.xml><?xml version="1.0" encoding="utf-8"?>
+<?mso-contentType ?>
+<FormTemplates xmlns="http://schemas.microsoft.com/sharepoint/v3/contenttype/forms">
+  <Display>DocumentLibraryForm</Display>
+  <Edit>DocumentLibraryForm</Edit>
+  <New>DocumentLibraryForm</New>
+</FormTemplates>
 </file>
 
-<file path=customXml/itemProps2.xml><?xml version="1.0" encoding="utf-8"?>
-<ds:datastoreItem xmlns:ds="http://schemas.openxmlformats.org/officeDocument/2006/customXml" ds:itemID="{C9D629DA-1682-46D9-99F5-A3E36C5BAC70}">
-  <ds:schemaRefs>
-    <ds:schemaRef ds:uri="http://schemas.microsoft.com/sharepoint/v3/contenttype/forms"/>
-  </ds:schemaRefs>
-</ds:datastoreItem>
+<file path=customXml/item3.xml><?xml version="1.0" encoding="utf-8"?>
+<p:properties xmlns:p="http://schemas.microsoft.com/office/2006/metadata/properties" xmlns:xsi="http://www.w3.org/2001/XMLSchema-instance" xmlns:pc="http://schemas.microsoft.com/office/infopath/2007/PartnerControls">
+  <documentManagement/>
+</p:properties>
 </file>
 
-<file path=customXml/itemProps3.xml><?xml version="1.0" encoding="utf-8"?>
+<file path=customXml/itemProps1.xml><?xml version="1.0" encoding="utf-8"?>
 <ds:datastoreItem xmlns:ds="http://schemas.openxmlformats.org/officeDocument/2006/customXml" ds:itemID="{107F0371-BB02-4AD4-8649-0CB5196935CE}">
   <ds:schemaRefs>
     <ds:schemaRef ds:uri="e794b067-c88c-4f69-971d-4e5f07b2fc26"/>
@@ -35359,4 +35335,28 @@
     <ds:schemaRef ds:uri="http://www.w3.org/2001/XMLSchema"/>
   </ds:schemaRefs>
 </ds:datastoreItem>
+</file>
+
+<file path=customXml/itemProps2.xml><?xml version="1.0" encoding="utf-8"?>
+<ds:datastoreItem xmlns:ds="http://schemas.openxmlformats.org/officeDocument/2006/customXml" ds:itemID="{C9D629DA-1682-46D9-99F5-A3E36C5BAC70}">
+  <ds:schemaRefs>
+    <ds:schemaRef ds:uri="http://schemas.microsoft.com/sharepoint/v3/contenttype/forms"/>
+  </ds:schemaRefs>
+</ds:datastoreItem>
+</file>
+
+<file path=customXml/itemProps3.xml><?xml version="1.0" encoding="utf-8"?>
+<ds:datastoreItem xmlns:ds="http://schemas.openxmlformats.org/officeDocument/2006/customXml" ds:itemID="{CAD84B9C-021F-40DE-807A-2D71E80356EE}">
+  <ds:schemaRefs>
+    <ds:schemaRef ds:uri="e794b067-c88c-4f69-971d-4e5f07b2fc26"/>
+    <ds:schemaRef ds:uri="http://schemas.microsoft.com/office/2006/metadata/properties"/>
+    <ds:schemaRef ds:uri="http://purl.org/dc/elements/1.1/"/>
+    <ds:schemaRef ds:uri="http://schemas.openxmlformats.org/package/2006/metadata/core-properties"/>
+    <ds:schemaRef ds:uri="http://purl.org/dc/terms/"/>
+    <ds:schemaRef ds:uri="http://www.w3.org/XML/1998/namespace"/>
+    <ds:schemaRef ds:uri="http://schemas.microsoft.com/office/2006/documentManagement/types"/>
+    <ds:schemaRef ds:uri="http://schemas.microsoft.com/office/infopath/2007/PartnerControls"/>
+    <ds:schemaRef ds:uri="http://purl.org/dc/dcmitype/"/>
+  </ds:schemaRefs>
+</ds:datastoreItem>
 </file>
</xml_diff>